<commit_message>
Update Tourism Recommendation System.pptx
</commit_message>
<xml_diff>
--- a/Report/Tourism Recommendation System.pptx
+++ b/Report/Tourism Recommendation System.pptx
@@ -114,6 +114,11 @@
       </a:defRPr>
     </a:lvl9pPr>
   </p:defaultTextStyle>
+  <p:extLst>
+    <p:ext uri="{EFAFB233-063F-42B5-8137-9DF3F51BA10A}">
+      <p15:sldGuideLst xmlns:p15="http://schemas.microsoft.com/office/powerpoint/2012/main"/>
+    </p:ext>
+  </p:extLst>
 </p:presentation>
 </file>
 
@@ -6124,9 +6129,12 @@
           </a:bodyPr>
           <a:lstStyle/>
           <a:p>
-            <a:r>
-              <a:rPr lang="en-US" dirty="0"/>
-              <a:t>Problem:</a:t>
+            <a:pPr marL="0" indent="0">
+              <a:buNone/>
+            </a:pPr>
+            <a:r>
+              <a:rPr lang="en-US" sz="2200" b="1" dirty="0"/>
+              <a:t>Problem</a:t>
             </a:r>
           </a:p>
           <a:p>
@@ -6142,9 +6150,12 @@
             </a:r>
           </a:p>
           <a:p>
-            <a:r>
-              <a:rPr lang="en-US" dirty="0"/>
-              <a:t>Background:</a:t>
+            <a:pPr marL="0" indent="0">
+              <a:buNone/>
+            </a:pPr>
+            <a:r>
+              <a:rPr lang="en-US" b="1" dirty="0"/>
+              <a:t>Background</a:t>
             </a:r>
           </a:p>
           <a:p>
@@ -6218,9 +6229,12 @@
           <a:bodyPr/>
           <a:lstStyle/>
           <a:p>
-            <a:r>
-              <a:rPr lang="en-US" dirty="0"/>
-              <a:t>Relevance:</a:t>
+            <a:pPr marL="0" indent="0">
+              <a:buNone/>
+            </a:pPr>
+            <a:r>
+              <a:rPr lang="en-US" b="1" dirty="0"/>
+              <a:t>Relevance</a:t>
             </a:r>
           </a:p>
           <a:p>
@@ -6320,9 +6334,12 @@
           </a:bodyPr>
           <a:lstStyle/>
           <a:p>
-            <a:r>
-              <a:rPr lang="en-US" dirty="0"/>
-              <a:t>Objective: </a:t>
+            <a:pPr marL="0" indent="0">
+              <a:buNone/>
+            </a:pPr>
+            <a:r>
+              <a:rPr lang="en-US" b="1" dirty="0"/>
+              <a:t>Objective</a:t>
             </a:r>
           </a:p>
           <a:p>
@@ -6414,9 +6431,12 @@
           <a:bodyPr/>
           <a:lstStyle/>
           <a:p>
-            <a:r>
-              <a:rPr lang="en-US" dirty="0"/>
-              <a:t>Scope:</a:t>
+            <a:pPr marL="0" indent="0">
+              <a:buNone/>
+            </a:pPr>
+            <a:r>
+              <a:rPr lang="en-US" b="1" dirty="0"/>
+              <a:t>Scope</a:t>
             </a:r>
           </a:p>
           <a:p>
@@ -6521,39 +6541,44 @@
             <p:ph idx="1"/>
           </p:nvPr>
         </p:nvSpPr>
-        <p:spPr/>
+        <p:spPr>
+          <a:xfrm>
+            <a:off x="913795" y="2096064"/>
+            <a:ext cx="10353762" cy="4389142"/>
+          </a:xfrm>
+        </p:spPr>
         <p:txBody>
           <a:bodyPr>
-            <a:normAutofit fontScale="77500" lnSpcReduction="20000"/>
+            <a:normAutofit fontScale="40000" lnSpcReduction="20000"/>
           </a:bodyPr>
           <a:lstStyle/>
           <a:p>
             <a:r>
-              <a:rPr lang="en-US" dirty="0"/>
+              <a:rPr lang="en-US" sz="4500" dirty="0"/>
               <a:t>Data Collection &amp; Creation: Procure data regarding tourism plans, pricing, places, cities etc., from the internet as well as creating it.</a:t>
             </a:r>
           </a:p>
           <a:p>
             <a:r>
-              <a:rPr lang="en-US" dirty="0"/>
+              <a:rPr lang="en-US" sz="4500" dirty="0"/>
               <a:t>Machine Learning Model: Develop a machine learning model which provides the best suiting recommendation to the user, incorporating various inputs developed during data collection and creation.</a:t>
             </a:r>
           </a:p>
           <a:p>
             <a:r>
-              <a:rPr lang="en-US" dirty="0"/>
+              <a:rPr lang="en-US" sz="4500" dirty="0"/>
               <a:t>Recommendation Generation: Utilize the model’s filtering algorithm to generate individualized plan recommendation for each user, incorporating the various details they provide such as their budget, place of travel, number of days, possible route etc.</a:t>
             </a:r>
           </a:p>
           <a:p>
             <a:r>
-              <a:rPr lang="en-US" dirty="0"/>
+              <a:rPr lang="en-US" sz="4500" dirty="0"/>
               <a:t>User Interface: Make a user-friendly and interactive interface that is intuitive to use and attractive to look at, it should be able to incorporate all planned functions in an organized and smooth manner.</a:t>
             </a:r>
           </a:p>
           <a:p>
             <a:r>
-              <a:rPr lang="en-US" dirty="0"/>
+              <a:rPr lang="en-US" sz="4500" dirty="0"/>
               <a:t>Functionality: The user interface will be implemented with required functionality after being planned and created.</a:t>
             </a:r>
           </a:p>
@@ -6637,17 +6662,26 @@
             <p:ph idx="1"/>
           </p:nvPr>
         </p:nvSpPr>
-        <p:spPr/>
+        <p:spPr>
+          <a:xfrm>
+            <a:off x="913795" y="2096064"/>
+            <a:ext cx="10353762" cy="4152336"/>
+          </a:xfrm>
+        </p:spPr>
         <p:txBody>
           <a:bodyPr>
-            <a:normAutofit fontScale="85000" lnSpcReduction="10000"/>
+            <a:normAutofit fontScale="92500" lnSpcReduction="10000"/>
           </a:bodyPr>
           <a:lstStyle/>
           <a:p>
-            <a:r>
-              <a:rPr lang="en-IN" dirty="0"/>
-              <a:t>Hardware requirements:</a:t>
-            </a:r>
+            <a:pPr marL="0" indent="0">
+              <a:buNone/>
+            </a:pPr>
+            <a:r>
+              <a:rPr lang="en-IN" b="1" dirty="0"/>
+              <a:t>Hardware requirements</a:t>
+            </a:r>
+            <a:endParaRPr lang="en-IN" dirty="0"/>
           </a:p>
           <a:p>
             <a:r>
@@ -6662,9 +6696,12 @@
             </a:r>
           </a:p>
           <a:p>
+            <a:pPr marL="0" indent="0">
+              <a:buNone/>
+            </a:pPr>
             <a:r>
               <a:rPr lang="en-IN" dirty="0"/>
-              <a:t>Software Requirement:</a:t>
+              <a:t>Software Requirements</a:t>
             </a:r>
           </a:p>
           <a:p>
@@ -6779,19 +6816,22 @@
         </p:nvSpPr>
         <p:spPr>
           <a:xfrm>
-            <a:off x="913795" y="2096063"/>
-            <a:ext cx="10353762" cy="4481199"/>
+            <a:off x="913795" y="1767201"/>
+            <a:ext cx="10353762" cy="4802411"/>
           </a:xfrm>
         </p:spPr>
         <p:txBody>
           <a:bodyPr>
-            <a:normAutofit fontScale="85000" lnSpcReduction="10000"/>
+            <a:normAutofit fontScale="92500" lnSpcReduction="20000"/>
           </a:bodyPr>
           <a:lstStyle/>
           <a:p>
-            <a:r>
-              <a:rPr lang="en-US" dirty="0"/>
-              <a:t>Resources:</a:t>
+            <a:pPr marL="0" indent="0">
+              <a:buNone/>
+            </a:pPr>
+            <a:r>
+              <a:rPr lang="en-US" b="1" dirty="0"/>
+              <a:t>Resources</a:t>
             </a:r>
           </a:p>
           <a:p>
@@ -6827,9 +6867,12 @@
             </a:r>
           </a:p>
           <a:p>
-            <a:r>
-              <a:rPr lang="en-US" dirty="0"/>
-              <a:t>Limitations:</a:t>
+            <a:pPr marL="0" indent="0">
+              <a:buNone/>
+            </a:pPr>
+            <a:r>
+              <a:rPr lang="en-US" b="1" dirty="0"/>
+              <a:t>Limitations</a:t>
             </a:r>
           </a:p>
           <a:p>

</xml_diff>